<commit_message>
add ppt and pbix
</commit_message>
<xml_diff>
--- a/Análisis del desgaste en el talento humano.pptx
+++ b/Análisis del desgaste en el talento humano.pptx
@@ -125,7 +125,7 @@
   <pc:docChgLst>
     <pc:chgData name="paula carrano" userId="e6bbaf04ec1aa7c5" providerId="LiveId" clId="{A23CF08E-08DC-4285-8755-DAC3BDA6C3DA}"/>
     <pc:docChg chg="undo custSel addSld delSld modSld">
-      <pc:chgData name="paula carrano" userId="e6bbaf04ec1aa7c5" providerId="LiveId" clId="{A23CF08E-08DC-4285-8755-DAC3BDA6C3DA}" dt="2024-03-05T21:37:57.982" v="594" actId="478"/>
+      <pc:chgData name="paula carrano" userId="e6bbaf04ec1aa7c5" providerId="LiveId" clId="{A23CF08E-08DC-4285-8755-DAC3BDA6C3DA}" dt="2024-03-07T18:21:43.033" v="607" actId="1076"/>
       <pc:docMkLst>
         <pc:docMk/>
       </pc:docMkLst>
@@ -652,7 +652,7 @@
         </pc:picChg>
       </pc:sldChg>
       <pc:sldChg chg="addSp delSp modSp new mod modTransition modClrScheme chgLayout">
-        <pc:chgData name="paula carrano" userId="e6bbaf04ec1aa7c5" providerId="LiveId" clId="{A23CF08E-08DC-4285-8755-DAC3BDA6C3DA}" dt="2024-03-04T22:27:15.115" v="556"/>
+        <pc:chgData name="paula carrano" userId="e6bbaf04ec1aa7c5" providerId="LiveId" clId="{A23CF08E-08DC-4285-8755-DAC3BDA6C3DA}" dt="2024-03-07T18:21:19.643" v="602" actId="1076"/>
         <pc:sldMkLst>
           <pc:docMk/>
           <pc:sldMk cId="2913224171" sldId="261"/>
@@ -714,7 +714,15 @@
           </ac:spMkLst>
         </pc:spChg>
         <pc:picChg chg="add mod">
-          <ac:chgData name="paula carrano" userId="e6bbaf04ec1aa7c5" providerId="LiveId" clId="{A23CF08E-08DC-4285-8755-DAC3BDA6C3DA}" dt="2024-03-04T21:36:40.851" v="446" actId="14100"/>
+          <ac:chgData name="paula carrano" userId="e6bbaf04ec1aa7c5" providerId="LiveId" clId="{A23CF08E-08DC-4285-8755-DAC3BDA6C3DA}" dt="2024-03-07T18:21:14.443" v="601" actId="14100"/>
+          <ac:picMkLst>
+            <pc:docMk/>
+            <pc:sldMk cId="2913224171" sldId="261"/>
+            <ac:picMk id="4" creationId="{483B8B04-59FD-759C-2850-8D6AA6CDBBBF}"/>
+          </ac:picMkLst>
+        </pc:picChg>
+        <pc:picChg chg="add mod">
+          <ac:chgData name="paula carrano" userId="e6bbaf04ec1aa7c5" providerId="LiveId" clId="{A23CF08E-08DC-4285-8755-DAC3BDA6C3DA}" dt="2024-03-07T18:21:19.643" v="602" actId="1076"/>
           <ac:picMkLst>
             <pc:docMk/>
             <pc:sldMk cId="2913224171" sldId="261"/>
@@ -729,8 +737,8 @@
             <ac:picMk id="11" creationId="{7D52DF3F-066F-120C-6448-656DA9ACDF9E}"/>
           </ac:picMkLst>
         </pc:picChg>
-        <pc:picChg chg="add mod">
-          <ac:chgData name="paula carrano" userId="e6bbaf04ec1aa7c5" providerId="LiveId" clId="{A23CF08E-08DC-4285-8755-DAC3BDA6C3DA}" dt="2024-03-04T21:36:42.251" v="447" actId="1076"/>
+        <pc:picChg chg="add del mod">
+          <ac:chgData name="paula carrano" userId="e6bbaf04ec1aa7c5" providerId="LiveId" clId="{A23CF08E-08DC-4285-8755-DAC3BDA6C3DA}" dt="2024-03-07T18:21:03.463" v="597" actId="478"/>
           <ac:picMkLst>
             <pc:docMk/>
             <pc:sldMk cId="2913224171" sldId="261"/>
@@ -739,11 +747,19 @@
         </pc:picChg>
       </pc:sldChg>
       <pc:sldChg chg="addSp delSp modSp new mod modTransition">
-        <pc:chgData name="paula carrano" userId="e6bbaf04ec1aa7c5" providerId="LiveId" clId="{A23CF08E-08DC-4285-8755-DAC3BDA6C3DA}" dt="2024-03-04T22:27:19.195" v="557"/>
+        <pc:chgData name="paula carrano" userId="e6bbaf04ec1aa7c5" providerId="LiveId" clId="{A23CF08E-08DC-4285-8755-DAC3BDA6C3DA}" dt="2024-03-07T18:21:43.033" v="607" actId="1076"/>
         <pc:sldMkLst>
           <pc:docMk/>
           <pc:sldMk cId="2336936045" sldId="262"/>
         </pc:sldMkLst>
+        <pc:picChg chg="add mod">
+          <ac:chgData name="paula carrano" userId="e6bbaf04ec1aa7c5" providerId="LiveId" clId="{A23CF08E-08DC-4285-8755-DAC3BDA6C3DA}" dt="2024-03-07T18:21:43.033" v="607" actId="1076"/>
+          <ac:picMkLst>
+            <pc:docMk/>
+            <pc:sldMk cId="2336936045" sldId="262"/>
+            <ac:picMk id="3" creationId="{6C0075CB-9718-B18E-F2FE-123E399FFB17}"/>
+          </ac:picMkLst>
+        </pc:picChg>
         <pc:picChg chg="add del mod">
           <ac:chgData name="paula carrano" userId="e6bbaf04ec1aa7c5" providerId="LiveId" clId="{A23CF08E-08DC-4285-8755-DAC3BDA6C3DA}" dt="2024-03-04T21:34:09.884" v="429" actId="21"/>
           <ac:picMkLst>
@@ -752,8 +768,8 @@
             <ac:picMk id="3" creationId="{BFCF1E09-1455-E69C-8214-F995E30787E5}"/>
           </ac:picMkLst>
         </pc:picChg>
-        <pc:picChg chg="add mod">
-          <ac:chgData name="paula carrano" userId="e6bbaf04ec1aa7c5" providerId="LiveId" clId="{A23CF08E-08DC-4285-8755-DAC3BDA6C3DA}" dt="2024-03-04T21:38:12.155" v="476" actId="1076"/>
+        <pc:picChg chg="add del mod">
+          <ac:chgData name="paula carrano" userId="e6bbaf04ec1aa7c5" providerId="LiveId" clId="{A23CF08E-08DC-4285-8755-DAC3BDA6C3DA}" dt="2024-03-07T18:21:25.443" v="603" actId="478"/>
           <ac:picMkLst>
             <pc:docMk/>
             <pc:sldMk cId="2336936045" sldId="262"/>
@@ -998,7 +1014,7 @@
           <a:noFill/>
           <a:extLst>
             <a:ext uri="{909E8E84-426E-40dd-AFC4-6F175D3DCCD1}">
-              <a14:hiddenFill xmlns="" xmlns:a14="http://schemas.microsoft.com/office/drawing/2010/main">
+              <a14:hiddenFill xmlns:a14="http://schemas.microsoft.com/office/drawing/2010/main" xmlns="">
                 <a:solidFill>
                   <a:srgbClr val="FFFFFF"/>
                 </a:solidFill>
@@ -1058,7 +1074,7 @@
             </a:ln>
             <a:extLst>
               <a:ext uri="{91240B29-F687-4f45-9708-019B960494DF}">
-                <a14:hiddenLine xmlns="" xmlns:a14="http://schemas.microsoft.com/office/drawing/2010/main" w="9525">
+                <a14:hiddenLine xmlns:a14="http://schemas.microsoft.com/office/drawing/2010/main" xmlns="" w="9525">
                   <a:solidFill>
                     <a:srgbClr val="000000"/>
                   </a:solidFill>
@@ -1148,7 +1164,7 @@
             </a:ln>
             <a:extLst>
               <a:ext uri="{91240B29-F687-4f45-9708-019B960494DF}">
-                <a14:hiddenLine xmlns="" xmlns:a14="http://schemas.microsoft.com/office/drawing/2010/main" w="9525">
+                <a14:hiddenLine xmlns:a14="http://schemas.microsoft.com/office/drawing/2010/main" xmlns="" w="9525">
                   <a:solidFill>
                     <a:srgbClr val="000000"/>
                   </a:solidFill>
@@ -1238,7 +1254,7 @@
             </a:ln>
             <a:extLst>
               <a:ext uri="{91240B29-F687-4f45-9708-019B960494DF}">
-                <a14:hiddenLine xmlns="" xmlns:a14="http://schemas.microsoft.com/office/drawing/2010/main" w="9525">
+                <a14:hiddenLine xmlns:a14="http://schemas.microsoft.com/office/drawing/2010/main" xmlns="" w="9525">
                   <a:solidFill>
                     <a:srgbClr val="000000"/>
                   </a:solidFill>
@@ -1272,7 +1288,7 @@
             </a:ln>
             <a:extLst>
               <a:ext uri="{91240B29-F687-4f45-9708-019B960494DF}">
-                <a14:hiddenLine xmlns="" xmlns:a14="http://schemas.microsoft.com/office/drawing/2010/main" w="9525">
+                <a14:hiddenLine xmlns:a14="http://schemas.microsoft.com/office/drawing/2010/main" xmlns="" w="9525">
                   <a:solidFill>
                     <a:srgbClr val="000000"/>
                   </a:solidFill>
@@ -1362,7 +1378,7 @@
             </a:ln>
             <a:extLst>
               <a:ext uri="{91240B29-F687-4f45-9708-019B960494DF}">
-                <a14:hiddenLine xmlns="" xmlns:a14="http://schemas.microsoft.com/office/drawing/2010/main" w="9525">
+                <a14:hiddenLine xmlns:a14="http://schemas.microsoft.com/office/drawing/2010/main" xmlns="" w="9525">
                   <a:solidFill>
                     <a:srgbClr val="000000"/>
                   </a:solidFill>
@@ -1424,7 +1440,7 @@
             </a:ln>
             <a:extLst>
               <a:ext uri="{91240B29-F687-4f45-9708-019B960494DF}">
-                <a14:hiddenLine xmlns="" xmlns:a14="http://schemas.microsoft.com/office/drawing/2010/main" w="9525">
+                <a14:hiddenLine xmlns:a14="http://schemas.microsoft.com/office/drawing/2010/main" xmlns="" w="9525">
                   <a:solidFill>
                     <a:srgbClr val="000000"/>
                   </a:solidFill>
@@ -1486,7 +1502,7 @@
             </a:ln>
             <a:extLst>
               <a:ext uri="{91240B29-F687-4f45-9708-019B960494DF}">
-                <a14:hiddenLine xmlns="" xmlns:a14="http://schemas.microsoft.com/office/drawing/2010/main" w="9525">
+                <a14:hiddenLine xmlns:a14="http://schemas.microsoft.com/office/drawing/2010/main" xmlns="" w="9525">
                   <a:solidFill>
                     <a:srgbClr val="000000"/>
                   </a:solidFill>
@@ -1576,7 +1592,7 @@
             </a:ln>
             <a:extLst>
               <a:ext uri="{91240B29-F687-4f45-9708-019B960494DF}">
-                <a14:hiddenLine xmlns="" xmlns:a14="http://schemas.microsoft.com/office/drawing/2010/main" w="9525">
+                <a14:hiddenLine xmlns:a14="http://schemas.microsoft.com/office/drawing/2010/main" xmlns="" w="9525">
                   <a:solidFill>
                     <a:srgbClr val="000000"/>
                   </a:solidFill>
@@ -1638,7 +1654,7 @@
             </a:ln>
             <a:extLst>
               <a:ext uri="{91240B29-F687-4f45-9708-019B960494DF}">
-                <a14:hiddenLine xmlns="" xmlns:a14="http://schemas.microsoft.com/office/drawing/2010/main" w="9525">
+                <a14:hiddenLine xmlns:a14="http://schemas.microsoft.com/office/drawing/2010/main" xmlns="" w="9525">
                   <a:solidFill>
                     <a:srgbClr val="000000"/>
                   </a:solidFill>
@@ -1700,7 +1716,7 @@
             </a:ln>
             <a:extLst>
               <a:ext uri="{91240B29-F687-4f45-9708-019B960494DF}">
-                <a14:hiddenLine xmlns="" xmlns:a14="http://schemas.microsoft.com/office/drawing/2010/main" w="9525">
+                <a14:hiddenLine xmlns:a14="http://schemas.microsoft.com/office/drawing/2010/main" xmlns="" w="9525">
                   <a:solidFill>
                     <a:srgbClr val="000000"/>
                   </a:solidFill>
@@ -1790,7 +1806,7 @@
             </a:ln>
             <a:extLst>
               <a:ext uri="{91240B29-F687-4f45-9708-019B960494DF}">
-                <a14:hiddenLine xmlns="" xmlns:a14="http://schemas.microsoft.com/office/drawing/2010/main" w="9525">
+                <a14:hiddenLine xmlns:a14="http://schemas.microsoft.com/office/drawing/2010/main" xmlns="" w="9525">
                   <a:solidFill>
                     <a:srgbClr val="000000"/>
                   </a:solidFill>
@@ -1880,7 +1896,7 @@
             </a:ln>
             <a:extLst>
               <a:ext uri="{91240B29-F687-4f45-9708-019B960494DF}">
-                <a14:hiddenLine xmlns="" xmlns:a14="http://schemas.microsoft.com/office/drawing/2010/main" w="9525">
+                <a14:hiddenLine xmlns:a14="http://schemas.microsoft.com/office/drawing/2010/main" xmlns="" w="9525">
                   <a:solidFill>
                     <a:srgbClr val="000000"/>
                   </a:solidFill>
@@ -1942,7 +1958,7 @@
             </a:ln>
             <a:extLst>
               <a:ext uri="{91240B29-F687-4f45-9708-019B960494DF}">
-                <a14:hiddenLine xmlns="" xmlns:a14="http://schemas.microsoft.com/office/drawing/2010/main" w="9525">
+                <a14:hiddenLine xmlns:a14="http://schemas.microsoft.com/office/drawing/2010/main" xmlns="" w="9525">
                   <a:solidFill>
                     <a:srgbClr val="000000"/>
                   </a:solidFill>
@@ -2052,7 +2068,7 @@
             </a:ln>
             <a:extLst>
               <a:ext uri="{91240B29-F687-4f45-9708-019B960494DF}">
-                <a14:hiddenLine xmlns="" xmlns:a14="http://schemas.microsoft.com/office/drawing/2010/main" w="9525">
+                <a14:hiddenLine xmlns:a14="http://schemas.microsoft.com/office/drawing/2010/main" xmlns="" w="9525">
                   <a:solidFill>
                     <a:srgbClr val="000000"/>
                   </a:solidFill>
@@ -2114,7 +2130,7 @@
             </a:ln>
             <a:extLst>
               <a:ext uri="{91240B29-F687-4f45-9708-019B960494DF}">
-                <a14:hiddenLine xmlns="" xmlns:a14="http://schemas.microsoft.com/office/drawing/2010/main" w="9525">
+                <a14:hiddenLine xmlns:a14="http://schemas.microsoft.com/office/drawing/2010/main" xmlns="" w="9525">
                   <a:solidFill>
                     <a:srgbClr val="000000"/>
                   </a:solidFill>
@@ -2204,7 +2220,7 @@
             </a:ln>
             <a:extLst>
               <a:ext uri="{91240B29-F687-4f45-9708-019B960494DF}">
-                <a14:hiddenLine xmlns="" xmlns:a14="http://schemas.microsoft.com/office/drawing/2010/main" w="9525">
+                <a14:hiddenLine xmlns:a14="http://schemas.microsoft.com/office/drawing/2010/main" xmlns="" w="9525">
                   <a:solidFill>
                     <a:srgbClr val="000000"/>
                   </a:solidFill>
@@ -2294,7 +2310,7 @@
             </a:ln>
             <a:extLst>
               <a:ext uri="{91240B29-F687-4f45-9708-019B960494DF}">
-                <a14:hiddenLine xmlns="" xmlns:a14="http://schemas.microsoft.com/office/drawing/2010/main" w="9525">
+                <a14:hiddenLine xmlns:a14="http://schemas.microsoft.com/office/drawing/2010/main" xmlns="" w="9525">
                   <a:solidFill>
                     <a:srgbClr val="000000"/>
                   </a:solidFill>
@@ -2356,7 +2372,7 @@
             </a:ln>
             <a:extLst>
               <a:ext uri="{91240B29-F687-4f45-9708-019B960494DF}">
-                <a14:hiddenLine xmlns="" xmlns:a14="http://schemas.microsoft.com/office/drawing/2010/main" w="9525">
+                <a14:hiddenLine xmlns:a14="http://schemas.microsoft.com/office/drawing/2010/main" xmlns="" w="9525">
                   <a:solidFill>
                     <a:srgbClr val="000000"/>
                   </a:solidFill>
@@ -2446,7 +2462,7 @@
             </a:ln>
             <a:extLst>
               <a:ext uri="{91240B29-F687-4f45-9708-019B960494DF}">
-                <a14:hiddenLine xmlns="" xmlns:a14="http://schemas.microsoft.com/office/drawing/2010/main" w="9525">
+                <a14:hiddenLine xmlns:a14="http://schemas.microsoft.com/office/drawing/2010/main" xmlns="" w="9525">
                   <a:solidFill>
                     <a:srgbClr val="000000"/>
                   </a:solidFill>
@@ -2536,7 +2552,7 @@
             </a:ln>
             <a:extLst>
               <a:ext uri="{91240B29-F687-4f45-9708-019B960494DF}">
-                <a14:hiddenLine xmlns="" xmlns:a14="http://schemas.microsoft.com/office/drawing/2010/main" w="9525">
+                <a14:hiddenLine xmlns:a14="http://schemas.microsoft.com/office/drawing/2010/main" xmlns="" w="9525">
                   <a:solidFill>
                     <a:srgbClr val="000000"/>
                   </a:solidFill>
@@ -2592,7 +2608,7 @@
             </a:ln>
             <a:extLst>
               <a:ext uri="{91240B29-F687-4f45-9708-019B960494DF}">
-                <a14:hiddenLine xmlns="" xmlns:a14="http://schemas.microsoft.com/office/drawing/2010/main" w="9525">
+                <a14:hiddenLine xmlns:a14="http://schemas.microsoft.com/office/drawing/2010/main" xmlns="" w="9525">
                   <a:solidFill>
                     <a:srgbClr val="000000"/>
                   </a:solidFill>
@@ -2682,7 +2698,7 @@
             </a:ln>
             <a:extLst>
               <a:ext uri="{91240B29-F687-4f45-9708-019B960494DF}">
-                <a14:hiddenLine xmlns="" xmlns:a14="http://schemas.microsoft.com/office/drawing/2010/main" w="9525">
+                <a14:hiddenLine xmlns:a14="http://schemas.microsoft.com/office/drawing/2010/main" xmlns="" w="9525">
                   <a:solidFill>
                     <a:srgbClr val="000000"/>
                   </a:solidFill>
@@ -2738,7 +2754,7 @@
             </a:ln>
             <a:extLst>
               <a:ext uri="{91240B29-F687-4f45-9708-019B960494DF}">
-                <a14:hiddenLine xmlns="" xmlns:a14="http://schemas.microsoft.com/office/drawing/2010/main" w="9525">
+                <a14:hiddenLine xmlns:a14="http://schemas.microsoft.com/office/drawing/2010/main" xmlns="" w="9525">
                   <a:solidFill>
                     <a:srgbClr val="000000"/>
                   </a:solidFill>
@@ -2828,7 +2844,7 @@
             </a:ln>
             <a:extLst>
               <a:ext uri="{91240B29-F687-4f45-9708-019B960494DF}">
-                <a14:hiddenLine xmlns="" xmlns:a14="http://schemas.microsoft.com/office/drawing/2010/main" w="9525">
+                <a14:hiddenLine xmlns:a14="http://schemas.microsoft.com/office/drawing/2010/main" xmlns="" w="9525">
                   <a:solidFill>
                     <a:srgbClr val="000000"/>
                   </a:solidFill>
@@ -2896,7 +2912,7 @@
             </a:ln>
             <a:extLst>
               <a:ext uri="{91240B29-F687-4f45-9708-019B960494DF}">
-                <a14:hiddenLine xmlns="" xmlns:a14="http://schemas.microsoft.com/office/drawing/2010/main" w="9525">
+                <a14:hiddenLine xmlns:a14="http://schemas.microsoft.com/office/drawing/2010/main" xmlns="" w="9525">
                   <a:solidFill>
                     <a:srgbClr val="000000"/>
                   </a:solidFill>
@@ -2986,7 +3002,7 @@
             </a:ln>
             <a:extLst>
               <a:ext uri="{91240B29-F687-4f45-9708-019B960494DF}">
-                <a14:hiddenLine xmlns="" xmlns:a14="http://schemas.microsoft.com/office/drawing/2010/main" w="9525">
+                <a14:hiddenLine xmlns:a14="http://schemas.microsoft.com/office/drawing/2010/main" xmlns="" w="9525">
                   <a:solidFill>
                     <a:srgbClr val="000000"/>
                   </a:solidFill>
@@ -3054,7 +3070,7 @@
             </a:ln>
             <a:extLst>
               <a:ext uri="{91240B29-F687-4f45-9708-019B960494DF}">
-                <a14:hiddenLine xmlns="" xmlns:a14="http://schemas.microsoft.com/office/drawing/2010/main" w="9525">
+                <a14:hiddenLine xmlns:a14="http://schemas.microsoft.com/office/drawing/2010/main" xmlns="" w="9525">
                   <a:solidFill>
                     <a:srgbClr val="000000"/>
                   </a:solidFill>
@@ -3144,7 +3160,7 @@
             </a:ln>
             <a:extLst>
               <a:ext uri="{91240B29-F687-4f45-9708-019B960494DF}">
-                <a14:hiddenLine xmlns="" xmlns:a14="http://schemas.microsoft.com/office/drawing/2010/main" w="9525">
+                <a14:hiddenLine xmlns:a14="http://schemas.microsoft.com/office/drawing/2010/main" xmlns="" w="9525">
                   <a:solidFill>
                     <a:srgbClr val="000000"/>
                   </a:solidFill>
@@ -3178,7 +3194,7 @@
             </a:ln>
             <a:extLst>
               <a:ext uri="{91240B29-F687-4f45-9708-019B960494DF}">
-                <a14:hiddenLine xmlns="" xmlns:a14="http://schemas.microsoft.com/office/drawing/2010/main" w="9525">
+                <a14:hiddenLine xmlns:a14="http://schemas.microsoft.com/office/drawing/2010/main" xmlns="" w="9525">
                   <a:solidFill>
                     <a:srgbClr val="000000"/>
                   </a:solidFill>
@@ -3268,7 +3284,7 @@
             </a:ln>
             <a:extLst>
               <a:ext uri="{91240B29-F687-4f45-9708-019B960494DF}">
-                <a14:hiddenLine xmlns="" xmlns:a14="http://schemas.microsoft.com/office/drawing/2010/main" w="9525">
+                <a14:hiddenLine xmlns:a14="http://schemas.microsoft.com/office/drawing/2010/main" xmlns="" w="9525">
                   <a:solidFill>
                     <a:srgbClr val="000000"/>
                   </a:solidFill>
@@ -3330,7 +3346,7 @@
             </a:ln>
             <a:extLst>
               <a:ext uri="{91240B29-F687-4f45-9708-019B960494DF}">
-                <a14:hiddenLine xmlns="" xmlns:a14="http://schemas.microsoft.com/office/drawing/2010/main" w="9525">
+                <a14:hiddenLine xmlns:a14="http://schemas.microsoft.com/office/drawing/2010/main" xmlns="" w="9525">
                   <a:solidFill>
                     <a:srgbClr val="000000"/>
                   </a:solidFill>
@@ -3392,7 +3408,7 @@
             </a:ln>
             <a:extLst>
               <a:ext uri="{91240B29-F687-4f45-9708-019B960494DF}">
-                <a14:hiddenLine xmlns="" xmlns:a14="http://schemas.microsoft.com/office/drawing/2010/main" w="9525">
+                <a14:hiddenLine xmlns:a14="http://schemas.microsoft.com/office/drawing/2010/main" xmlns="" w="9525">
                   <a:solidFill>
                     <a:srgbClr val="000000"/>
                   </a:solidFill>
@@ -3482,7 +3498,7 @@
             </a:ln>
             <a:extLst>
               <a:ext uri="{91240B29-F687-4f45-9708-019B960494DF}">
-                <a14:hiddenLine xmlns="" xmlns:a14="http://schemas.microsoft.com/office/drawing/2010/main" w="9525">
+                <a14:hiddenLine xmlns:a14="http://schemas.microsoft.com/office/drawing/2010/main" xmlns="" w="9525">
                   <a:solidFill>
                     <a:srgbClr val="000000"/>
                   </a:solidFill>
@@ -3550,7 +3566,7 @@
             </a:ln>
             <a:extLst>
               <a:ext uri="{91240B29-F687-4f45-9708-019B960494DF}">
-                <a14:hiddenLine xmlns="" xmlns:a14="http://schemas.microsoft.com/office/drawing/2010/main" w="9525">
+                <a14:hiddenLine xmlns:a14="http://schemas.microsoft.com/office/drawing/2010/main" xmlns="" w="9525">
                   <a:solidFill>
                     <a:srgbClr val="000000"/>
                   </a:solidFill>
@@ -3612,7 +3628,7 @@
             </a:ln>
             <a:extLst>
               <a:ext uri="{91240B29-F687-4f45-9708-019B960494DF}">
-                <a14:hiddenLine xmlns="" xmlns:a14="http://schemas.microsoft.com/office/drawing/2010/main" w="9525">
+                <a14:hiddenLine xmlns:a14="http://schemas.microsoft.com/office/drawing/2010/main" xmlns="" w="9525">
                   <a:solidFill>
                     <a:srgbClr val="000000"/>
                   </a:solidFill>
@@ -3702,7 +3718,7 @@
             </a:ln>
             <a:extLst>
               <a:ext uri="{91240B29-F687-4f45-9708-019B960494DF}">
-                <a14:hiddenLine xmlns="" xmlns:a14="http://schemas.microsoft.com/office/drawing/2010/main" w="9525">
+                <a14:hiddenLine xmlns:a14="http://schemas.microsoft.com/office/drawing/2010/main" xmlns="" w="9525">
                   <a:solidFill>
                     <a:srgbClr val="000000"/>
                   </a:solidFill>
@@ -3764,7 +3780,7 @@
             </a:ln>
             <a:extLst>
               <a:ext uri="{91240B29-F687-4f45-9708-019B960494DF}">
-                <a14:hiddenLine xmlns="" xmlns:a14="http://schemas.microsoft.com/office/drawing/2010/main" w="9525">
+                <a14:hiddenLine xmlns:a14="http://schemas.microsoft.com/office/drawing/2010/main" xmlns="" w="9525">
                   <a:solidFill>
                     <a:srgbClr val="000000"/>
                   </a:solidFill>
@@ -3854,7 +3870,7 @@
             </a:ln>
             <a:extLst>
               <a:ext uri="{91240B29-F687-4f45-9708-019B960494DF}">
-                <a14:hiddenLine xmlns="" xmlns:a14="http://schemas.microsoft.com/office/drawing/2010/main" w="9525">
+                <a14:hiddenLine xmlns:a14="http://schemas.microsoft.com/office/drawing/2010/main" xmlns="" w="9525">
                   <a:solidFill>
                     <a:srgbClr val="000000"/>
                   </a:solidFill>
@@ -3916,7 +3932,7 @@
             </a:ln>
             <a:extLst>
               <a:ext uri="{91240B29-F687-4f45-9708-019B960494DF}">
-                <a14:hiddenLine xmlns="" xmlns:a14="http://schemas.microsoft.com/office/drawing/2010/main" w="9525">
+                <a14:hiddenLine xmlns:a14="http://schemas.microsoft.com/office/drawing/2010/main" xmlns="" w="9525">
                   <a:solidFill>
                     <a:srgbClr val="000000"/>
                   </a:solidFill>
@@ -4006,7 +4022,7 @@
             </a:ln>
             <a:extLst>
               <a:ext uri="{91240B29-F687-4f45-9708-019B960494DF}">
-                <a14:hiddenLine xmlns="" xmlns:a14="http://schemas.microsoft.com/office/drawing/2010/main" w="9525">
+                <a14:hiddenLine xmlns:a14="http://schemas.microsoft.com/office/drawing/2010/main" xmlns="" w="9525">
                   <a:solidFill>
                     <a:srgbClr val="000000"/>
                   </a:solidFill>
@@ -4040,7 +4056,7 @@
             </a:ln>
             <a:extLst>
               <a:ext uri="{91240B29-F687-4f45-9708-019B960494DF}">
-                <a14:hiddenLine xmlns="" xmlns:a14="http://schemas.microsoft.com/office/drawing/2010/main" w="9525">
+                <a14:hiddenLine xmlns:a14="http://schemas.microsoft.com/office/drawing/2010/main" xmlns="" w="9525">
                   <a:solidFill>
                     <a:srgbClr val="000000"/>
                   </a:solidFill>
@@ -4105,7 +4121,7 @@
             </a:ln>
             <a:extLst>
               <a:ext uri="{91240B29-F687-4f45-9708-019B960494DF}">
-                <a14:hiddenLine xmlns="" xmlns:a14="http://schemas.microsoft.com/office/drawing/2010/main" w="9525">
+                <a14:hiddenLine xmlns:a14="http://schemas.microsoft.com/office/drawing/2010/main" xmlns="" w="9525">
                   <a:solidFill>
                     <a:srgbClr val="000000"/>
                   </a:solidFill>
@@ -4195,7 +4211,7 @@
             </a:ln>
             <a:extLst>
               <a:ext uri="{91240B29-F687-4f45-9708-019B960494DF}">
-                <a14:hiddenLine xmlns="" xmlns:a14="http://schemas.microsoft.com/office/drawing/2010/main" w="9525">
+                <a14:hiddenLine xmlns:a14="http://schemas.microsoft.com/office/drawing/2010/main" xmlns="" w="9525">
                   <a:solidFill>
                     <a:srgbClr val="000000"/>
                   </a:solidFill>
@@ -4257,7 +4273,7 @@
             </a:ln>
             <a:extLst>
               <a:ext uri="{91240B29-F687-4f45-9708-019B960494DF}">
-                <a14:hiddenLine xmlns="" xmlns:a14="http://schemas.microsoft.com/office/drawing/2010/main" w="9525">
+                <a14:hiddenLine xmlns:a14="http://schemas.microsoft.com/office/drawing/2010/main" xmlns="" w="9525">
                   <a:solidFill>
                     <a:srgbClr val="000000"/>
                   </a:solidFill>
@@ -4347,7 +4363,7 @@
             </a:ln>
             <a:extLst>
               <a:ext uri="{91240B29-F687-4f45-9708-019B960494DF}">
-                <a14:hiddenLine xmlns="" xmlns:a14="http://schemas.microsoft.com/office/drawing/2010/main" w="9525">
+                <a14:hiddenLine xmlns:a14="http://schemas.microsoft.com/office/drawing/2010/main" xmlns="" w="9525">
                   <a:solidFill>
                     <a:srgbClr val="000000"/>
                   </a:solidFill>
@@ -4437,7 +4453,7 @@
             </a:ln>
             <a:extLst>
               <a:ext uri="{91240B29-F687-4f45-9708-019B960494DF}">
-                <a14:hiddenLine xmlns="" xmlns:a14="http://schemas.microsoft.com/office/drawing/2010/main" w="9525">
+                <a14:hiddenLine xmlns:a14="http://schemas.microsoft.com/office/drawing/2010/main" xmlns="" w="9525">
                   <a:solidFill>
                     <a:srgbClr val="000000"/>
                   </a:solidFill>
@@ -4502,7 +4518,7 @@
             </a:ln>
             <a:extLst>
               <a:ext uri="{91240B29-F687-4f45-9708-019B960494DF}">
-                <a14:hiddenLine xmlns="" xmlns:a14="http://schemas.microsoft.com/office/drawing/2010/main" w="9525">
+                <a14:hiddenLine xmlns:a14="http://schemas.microsoft.com/office/drawing/2010/main" xmlns="" w="9525">
                   <a:solidFill>
                     <a:srgbClr val="000000"/>
                   </a:solidFill>
@@ -4564,7 +4580,7 @@
             </a:ln>
             <a:extLst>
               <a:ext uri="{91240B29-F687-4f45-9708-019B960494DF}">
-                <a14:hiddenLine xmlns="" xmlns:a14="http://schemas.microsoft.com/office/drawing/2010/main" w="9525">
+                <a14:hiddenLine xmlns:a14="http://schemas.microsoft.com/office/drawing/2010/main" xmlns="" w="9525">
                   <a:solidFill>
                     <a:srgbClr val="000000"/>
                   </a:solidFill>
@@ -4654,7 +4670,7 @@
             </a:ln>
             <a:extLst>
               <a:ext uri="{91240B29-F687-4f45-9708-019B960494DF}">
-                <a14:hiddenLine xmlns="" xmlns:a14="http://schemas.microsoft.com/office/drawing/2010/main" w="9525">
+                <a14:hiddenLine xmlns:a14="http://schemas.microsoft.com/office/drawing/2010/main" xmlns="" w="9525">
                   <a:solidFill>
                     <a:srgbClr val="000000"/>
                   </a:solidFill>
@@ -4744,7 +4760,7 @@
             </a:ln>
             <a:extLst>
               <a:ext uri="{91240B29-F687-4f45-9708-019B960494DF}">
-                <a14:hiddenLine xmlns="" xmlns:a14="http://schemas.microsoft.com/office/drawing/2010/main" w="9525">
+                <a14:hiddenLine xmlns:a14="http://schemas.microsoft.com/office/drawing/2010/main" xmlns="" w="9525">
                   <a:solidFill>
                     <a:srgbClr val="000000"/>
                   </a:solidFill>
@@ -4806,7 +4822,7 @@
             </a:ln>
             <a:extLst>
               <a:ext uri="{91240B29-F687-4f45-9708-019B960494DF}">
-                <a14:hiddenLine xmlns="" xmlns:a14="http://schemas.microsoft.com/office/drawing/2010/main" w="9525">
+                <a14:hiddenLine xmlns:a14="http://schemas.microsoft.com/office/drawing/2010/main" xmlns="" w="9525">
                   <a:solidFill>
                     <a:srgbClr val="000000"/>
                   </a:solidFill>
@@ -4926,7 +4942,7 @@
             </a:ln>
             <a:extLst>
               <a:ext uri="{91240B29-F687-4f45-9708-019B960494DF}">
-                <a14:hiddenLine xmlns="" xmlns:a14="http://schemas.microsoft.com/office/drawing/2010/main" w="9525">
+                <a14:hiddenLine xmlns:a14="http://schemas.microsoft.com/office/drawing/2010/main" xmlns="" w="9525">
                   <a:solidFill>
                     <a:srgbClr val="000000"/>
                   </a:solidFill>
@@ -4994,7 +5010,7 @@
             </a:ln>
             <a:extLst>
               <a:ext uri="{91240B29-F687-4f45-9708-019B960494DF}">
-                <a14:hiddenLine xmlns="" xmlns:a14="http://schemas.microsoft.com/office/drawing/2010/main" w="9525">
+                <a14:hiddenLine xmlns:a14="http://schemas.microsoft.com/office/drawing/2010/main" xmlns="" w="9525">
                   <a:solidFill>
                     <a:srgbClr val="000000"/>
                   </a:solidFill>
@@ -5084,7 +5100,7 @@
             </a:ln>
             <a:extLst>
               <a:ext uri="{91240B29-F687-4f45-9708-019B960494DF}">
-                <a14:hiddenLine xmlns="" xmlns:a14="http://schemas.microsoft.com/office/drawing/2010/main" w="9525">
+                <a14:hiddenLine xmlns:a14="http://schemas.microsoft.com/office/drawing/2010/main" xmlns="" w="9525">
                   <a:solidFill>
                     <a:srgbClr val="000000"/>
                   </a:solidFill>
@@ -5224,7 +5240,7 @@
           <a:p>
             <a:fld id="{9F451DDC-D80E-410B-94F7-6BC23402F4C3}" type="datetimeFigureOut">
               <a:rPr lang="es-AR" smtClean="0"/>
-              <a:t>5/3/2024</a:t>
+              <a:t>7/3/2024</a:t>
             </a:fld>
             <a:endParaRPr lang="es-AR"/>
           </a:p>
@@ -5491,7 +5507,7 @@
           <a:p>
             <a:fld id="{9F451DDC-D80E-410B-94F7-6BC23402F4C3}" type="datetimeFigureOut">
               <a:rPr lang="es-AR" smtClean="0"/>
-              <a:t>5/3/2024</a:t>
+              <a:t>7/3/2024</a:t>
             </a:fld>
             <a:endParaRPr lang="es-AR"/>
           </a:p>
@@ -5687,7 +5703,7 @@
           <a:p>
             <a:fld id="{9F451DDC-D80E-410B-94F7-6BC23402F4C3}" type="datetimeFigureOut">
               <a:rPr lang="es-AR" smtClean="0"/>
-              <a:t>5/3/2024</a:t>
+              <a:t>7/3/2024</a:t>
             </a:fld>
             <a:endParaRPr lang="es-AR"/>
           </a:p>
@@ -5950,7 +5966,7 @@
           <a:p>
             <a:fld id="{9F451DDC-D80E-410B-94F7-6BC23402F4C3}" type="datetimeFigureOut">
               <a:rPr lang="es-AR" smtClean="0"/>
-              <a:t>5/3/2024</a:t>
+              <a:t>7/3/2024</a:t>
             </a:fld>
             <a:endParaRPr lang="es-AR"/>
           </a:p>
@@ -6384,7 +6400,7 @@
           <a:p>
             <a:fld id="{9F451DDC-D80E-410B-94F7-6BC23402F4C3}" type="datetimeFigureOut">
               <a:rPr lang="es-AR" smtClean="0"/>
-              <a:t>5/3/2024</a:t>
+              <a:t>7/3/2024</a:t>
             </a:fld>
             <a:endParaRPr lang="es-AR"/>
           </a:p>
@@ -6930,7 +6946,7 @@
           <a:p>
             <a:fld id="{9F451DDC-D80E-410B-94F7-6BC23402F4C3}" type="datetimeFigureOut">
               <a:rPr lang="es-AR" smtClean="0"/>
-              <a:t>5/3/2024</a:t>
+              <a:t>7/3/2024</a:t>
             </a:fld>
             <a:endParaRPr lang="es-AR"/>
           </a:p>
@@ -7650,7 +7666,7 @@
           <a:p>
             <a:fld id="{9F451DDC-D80E-410B-94F7-6BC23402F4C3}" type="datetimeFigureOut">
               <a:rPr lang="es-AR" smtClean="0"/>
-              <a:t>5/3/2024</a:t>
+              <a:t>7/3/2024</a:t>
             </a:fld>
             <a:endParaRPr lang="es-AR"/>
           </a:p>
@@ -7820,7 +7836,7 @@
           <a:p>
             <a:fld id="{9F451DDC-D80E-410B-94F7-6BC23402F4C3}" type="datetimeFigureOut">
               <a:rPr lang="es-AR" smtClean="0"/>
-              <a:t>5/3/2024</a:t>
+              <a:t>7/3/2024</a:t>
             </a:fld>
             <a:endParaRPr lang="es-AR"/>
           </a:p>
@@ -8000,7 +8016,7 @@
           <a:p>
             <a:fld id="{9F451DDC-D80E-410B-94F7-6BC23402F4C3}" type="datetimeFigureOut">
               <a:rPr lang="es-AR" smtClean="0"/>
-              <a:t>5/3/2024</a:t>
+              <a:t>7/3/2024</a:t>
             </a:fld>
             <a:endParaRPr lang="es-AR"/>
           </a:p>
@@ -8170,7 +8186,7 @@
           <a:p>
             <a:fld id="{9F451DDC-D80E-410B-94F7-6BC23402F4C3}" type="datetimeFigureOut">
               <a:rPr lang="es-AR" smtClean="0"/>
-              <a:t>5/3/2024</a:t>
+              <a:t>7/3/2024</a:t>
             </a:fld>
             <a:endParaRPr lang="es-AR"/>
           </a:p>
@@ -8420,7 +8436,7 @@
           <a:p>
             <a:fld id="{9F451DDC-D80E-410B-94F7-6BC23402F4C3}" type="datetimeFigureOut">
               <a:rPr lang="es-AR" smtClean="0"/>
-              <a:t>5/3/2024</a:t>
+              <a:t>7/3/2024</a:t>
             </a:fld>
             <a:endParaRPr lang="es-AR"/>
           </a:p>
@@ -8652,7 +8668,7 @@
           <a:p>
             <a:fld id="{9F451DDC-D80E-410B-94F7-6BC23402F4C3}" type="datetimeFigureOut">
               <a:rPr lang="es-AR" smtClean="0"/>
-              <a:t>5/3/2024</a:t>
+              <a:t>7/3/2024</a:t>
             </a:fld>
             <a:endParaRPr lang="es-AR"/>
           </a:p>
@@ -9033,7 +9049,7 @@
           <a:p>
             <a:fld id="{9F451DDC-D80E-410B-94F7-6BC23402F4C3}" type="datetimeFigureOut">
               <a:rPr lang="es-AR" smtClean="0"/>
-              <a:t>5/3/2024</a:t>
+              <a:t>7/3/2024</a:t>
             </a:fld>
             <a:endParaRPr lang="es-AR"/>
           </a:p>
@@ -9151,7 +9167,7 @@
           <a:p>
             <a:fld id="{9F451DDC-D80E-410B-94F7-6BC23402F4C3}" type="datetimeFigureOut">
               <a:rPr lang="es-AR" smtClean="0"/>
-              <a:t>5/3/2024</a:t>
+              <a:t>7/3/2024</a:t>
             </a:fld>
             <a:endParaRPr lang="es-AR"/>
           </a:p>
@@ -9246,7 +9262,7 @@
           <a:p>
             <a:fld id="{9F451DDC-D80E-410B-94F7-6BC23402F4C3}" type="datetimeFigureOut">
               <a:rPr lang="es-AR" smtClean="0"/>
-              <a:t>5/3/2024</a:t>
+              <a:t>7/3/2024</a:t>
             </a:fld>
             <a:endParaRPr lang="es-AR"/>
           </a:p>
@@ -9495,7 +9511,7 @@
           <a:p>
             <a:fld id="{9F451DDC-D80E-410B-94F7-6BC23402F4C3}" type="datetimeFigureOut">
               <a:rPr lang="es-AR" smtClean="0"/>
-              <a:t>5/3/2024</a:t>
+              <a:t>7/3/2024</a:t>
             </a:fld>
             <a:endParaRPr lang="es-AR"/>
           </a:p>
@@ -9775,7 +9791,7 @@
           <a:p>
             <a:fld id="{9F451DDC-D80E-410B-94F7-6BC23402F4C3}" type="datetimeFigureOut">
               <a:rPr lang="es-AR" smtClean="0"/>
-              <a:t>5/3/2024</a:t>
+              <a:t>7/3/2024</a:t>
             </a:fld>
             <a:endParaRPr lang="es-AR"/>
           </a:p>
@@ -9891,7 +9907,7 @@
           <a:noFill/>
           <a:extLst>
             <a:ext uri="{909E8E84-426E-40dd-AFC4-6F175D3DCCD1}">
-              <a14:hiddenFill xmlns="" xmlns:a14="http://schemas.microsoft.com/office/drawing/2010/main">
+              <a14:hiddenFill xmlns:a14="http://schemas.microsoft.com/office/drawing/2010/main" xmlns="">
                 <a:solidFill>
                   <a:srgbClr val="FFFFFF"/>
                 </a:solidFill>
@@ -9965,7 +9981,7 @@
               </a:ln>
               <a:extLst>
                 <a:ext uri="{91240B29-F687-4f45-9708-019B960494DF}">
-                  <a14:hiddenLine xmlns="" xmlns:a14="http://schemas.microsoft.com/office/drawing/2010/main" w="9525">
+                  <a14:hiddenLine xmlns:a14="http://schemas.microsoft.com/office/drawing/2010/main" xmlns="" w="9525">
                     <a:solidFill>
                       <a:srgbClr val="000000"/>
                     </a:solidFill>
@@ -10055,7 +10071,7 @@
               </a:ln>
               <a:extLst>
                 <a:ext uri="{91240B29-F687-4f45-9708-019B960494DF}">
-                  <a14:hiddenLine xmlns="" xmlns:a14="http://schemas.microsoft.com/office/drawing/2010/main" w="9525">
+                  <a14:hiddenLine xmlns:a14="http://schemas.microsoft.com/office/drawing/2010/main" xmlns="" w="9525">
                     <a:solidFill>
                       <a:srgbClr val="000000"/>
                     </a:solidFill>
@@ -10145,7 +10161,7 @@
               </a:ln>
               <a:extLst>
                 <a:ext uri="{91240B29-F687-4f45-9708-019B960494DF}">
-                  <a14:hiddenLine xmlns="" xmlns:a14="http://schemas.microsoft.com/office/drawing/2010/main" w="9525">
+                  <a14:hiddenLine xmlns:a14="http://schemas.microsoft.com/office/drawing/2010/main" xmlns="" w="9525">
                     <a:solidFill>
                       <a:srgbClr val="000000"/>
                     </a:solidFill>
@@ -10207,7 +10223,7 @@
               </a:ln>
               <a:extLst>
                 <a:ext uri="{91240B29-F687-4f45-9708-019B960494DF}">
-                  <a14:hiddenLine xmlns="" xmlns:a14="http://schemas.microsoft.com/office/drawing/2010/main" w="9525">
+                  <a14:hiddenLine xmlns:a14="http://schemas.microsoft.com/office/drawing/2010/main" xmlns="" w="9525">
                     <a:solidFill>
                       <a:srgbClr val="000000"/>
                     </a:solidFill>
@@ -10297,7 +10313,7 @@
               </a:ln>
               <a:extLst>
                 <a:ext uri="{91240B29-F687-4f45-9708-019B960494DF}">
-                  <a14:hiddenLine xmlns="" xmlns:a14="http://schemas.microsoft.com/office/drawing/2010/main" w="9525">
+                  <a14:hiddenLine xmlns:a14="http://schemas.microsoft.com/office/drawing/2010/main" xmlns="" w="9525">
                     <a:solidFill>
                       <a:srgbClr val="000000"/>
                     </a:solidFill>
@@ -10359,7 +10375,7 @@
               </a:ln>
               <a:extLst>
                 <a:ext uri="{91240B29-F687-4f45-9708-019B960494DF}">
-                  <a14:hiddenLine xmlns="" xmlns:a14="http://schemas.microsoft.com/office/drawing/2010/main" w="9525">
+                  <a14:hiddenLine xmlns:a14="http://schemas.microsoft.com/office/drawing/2010/main" xmlns="" w="9525">
                     <a:solidFill>
                       <a:srgbClr val="000000"/>
                     </a:solidFill>
@@ -10421,7 +10437,7 @@
               </a:ln>
               <a:extLst>
                 <a:ext uri="{91240B29-F687-4f45-9708-019B960494DF}">
-                  <a14:hiddenLine xmlns="" xmlns:a14="http://schemas.microsoft.com/office/drawing/2010/main" w="9525">
+                  <a14:hiddenLine xmlns:a14="http://schemas.microsoft.com/office/drawing/2010/main" xmlns="" w="9525">
                     <a:solidFill>
                       <a:srgbClr val="000000"/>
                     </a:solidFill>
@@ -10511,7 +10527,7 @@
               </a:ln>
               <a:extLst>
                 <a:ext uri="{91240B29-F687-4f45-9708-019B960494DF}">
-                  <a14:hiddenLine xmlns="" xmlns:a14="http://schemas.microsoft.com/office/drawing/2010/main" w="9525">
+                  <a14:hiddenLine xmlns:a14="http://schemas.microsoft.com/office/drawing/2010/main" xmlns="" w="9525">
                     <a:solidFill>
                       <a:srgbClr val="000000"/>
                     </a:solidFill>
@@ -10601,7 +10617,7 @@
               </a:ln>
               <a:extLst>
                 <a:ext uri="{91240B29-F687-4f45-9708-019B960494DF}">
-                  <a14:hiddenLine xmlns="" xmlns:a14="http://schemas.microsoft.com/office/drawing/2010/main" w="9525">
+                  <a14:hiddenLine xmlns:a14="http://schemas.microsoft.com/office/drawing/2010/main" xmlns="" w="9525">
                     <a:solidFill>
                       <a:srgbClr val="000000"/>
                     </a:solidFill>
@@ -10663,7 +10679,7 @@
               </a:ln>
               <a:extLst>
                 <a:ext uri="{91240B29-F687-4f45-9708-019B960494DF}">
-                  <a14:hiddenLine xmlns="" xmlns:a14="http://schemas.microsoft.com/office/drawing/2010/main" w="9525">
+                  <a14:hiddenLine xmlns:a14="http://schemas.microsoft.com/office/drawing/2010/main" xmlns="" w="9525">
                     <a:solidFill>
                       <a:srgbClr val="000000"/>
                     </a:solidFill>
@@ -10773,7 +10789,7 @@
               </a:ln>
               <a:extLst>
                 <a:ext uri="{91240B29-F687-4f45-9708-019B960494DF}">
-                  <a14:hiddenLine xmlns="" xmlns:a14="http://schemas.microsoft.com/office/drawing/2010/main" w="9525">
+                  <a14:hiddenLine xmlns:a14="http://schemas.microsoft.com/office/drawing/2010/main" xmlns="" w="9525">
                     <a:solidFill>
                       <a:srgbClr val="000000"/>
                     </a:solidFill>
@@ -10857,7 +10873,7 @@
               </a:ln>
               <a:extLst>
                 <a:ext uri="{91240B29-F687-4f45-9708-019B960494DF}">
-                  <a14:hiddenLine xmlns="" xmlns:a14="http://schemas.microsoft.com/office/drawing/2010/main" w="9525">
+                  <a14:hiddenLine xmlns:a14="http://schemas.microsoft.com/office/drawing/2010/main" xmlns="" w="9525">
                     <a:solidFill>
                       <a:srgbClr val="000000"/>
                     </a:solidFill>
@@ -10919,7 +10935,7 @@
               </a:ln>
               <a:extLst>
                 <a:ext uri="{91240B29-F687-4f45-9708-019B960494DF}">
-                  <a14:hiddenLine xmlns="" xmlns:a14="http://schemas.microsoft.com/office/drawing/2010/main" w="9525">
+                  <a14:hiddenLine xmlns:a14="http://schemas.microsoft.com/office/drawing/2010/main" xmlns="" w="9525">
                     <a:solidFill>
                       <a:srgbClr val="000000"/>
                     </a:solidFill>
@@ -10981,7 +10997,7 @@
               </a:ln>
               <a:extLst>
                 <a:ext uri="{91240B29-F687-4f45-9708-019B960494DF}">
-                  <a14:hiddenLine xmlns="" xmlns:a14="http://schemas.microsoft.com/office/drawing/2010/main" w="9525">
+                  <a14:hiddenLine xmlns:a14="http://schemas.microsoft.com/office/drawing/2010/main" xmlns="" w="9525">
                     <a:solidFill>
                       <a:srgbClr val="000000"/>
                     </a:solidFill>
@@ -11071,7 +11087,7 @@
               </a:ln>
               <a:extLst>
                 <a:ext uri="{91240B29-F687-4f45-9708-019B960494DF}">
-                  <a14:hiddenLine xmlns="" xmlns:a14="http://schemas.microsoft.com/office/drawing/2010/main" w="9525">
+                  <a14:hiddenLine xmlns:a14="http://schemas.microsoft.com/office/drawing/2010/main" xmlns="" w="9525">
                     <a:solidFill>
                       <a:srgbClr val="000000"/>
                     </a:solidFill>
@@ -11105,7 +11121,7 @@
               </a:ln>
               <a:extLst>
                 <a:ext uri="{91240B29-F687-4f45-9708-019B960494DF}">
-                  <a14:hiddenLine xmlns="" xmlns:a14="http://schemas.microsoft.com/office/drawing/2010/main" w="9525">
+                  <a14:hiddenLine xmlns:a14="http://schemas.microsoft.com/office/drawing/2010/main" xmlns="" w="9525">
                     <a:solidFill>
                       <a:srgbClr val="000000"/>
                     </a:solidFill>
@@ -11170,7 +11186,7 @@
               </a:ln>
               <a:extLst>
                 <a:ext uri="{91240B29-F687-4f45-9708-019B960494DF}">
-                  <a14:hiddenLine xmlns="" xmlns:a14="http://schemas.microsoft.com/office/drawing/2010/main" w="9525">
+                  <a14:hiddenLine xmlns:a14="http://schemas.microsoft.com/office/drawing/2010/main" xmlns="" w="9525">
                     <a:solidFill>
                       <a:srgbClr val="000000"/>
                     </a:solidFill>
@@ -11260,7 +11276,7 @@
               </a:ln>
               <a:extLst>
                 <a:ext uri="{91240B29-F687-4f45-9708-019B960494DF}">
-                  <a14:hiddenLine xmlns="" xmlns:a14="http://schemas.microsoft.com/office/drawing/2010/main" w="9525">
+                  <a14:hiddenLine xmlns:a14="http://schemas.microsoft.com/office/drawing/2010/main" xmlns="" w="9525">
                     <a:solidFill>
                       <a:srgbClr val="000000"/>
                     </a:solidFill>
@@ -11322,7 +11338,7 @@
               </a:ln>
               <a:extLst>
                 <a:ext uri="{91240B29-F687-4f45-9708-019B960494DF}">
-                  <a14:hiddenLine xmlns="" xmlns:a14="http://schemas.microsoft.com/office/drawing/2010/main" w="9525">
+                  <a14:hiddenLine xmlns:a14="http://schemas.microsoft.com/office/drawing/2010/main" xmlns="" w="9525">
                     <a:solidFill>
                       <a:srgbClr val="000000"/>
                     </a:solidFill>
@@ -11412,7 +11428,7 @@
               </a:ln>
               <a:extLst>
                 <a:ext uri="{91240B29-F687-4f45-9708-019B960494DF}">
-                  <a14:hiddenLine xmlns="" xmlns:a14="http://schemas.microsoft.com/office/drawing/2010/main" w="9525">
+                  <a14:hiddenLine xmlns:a14="http://schemas.microsoft.com/office/drawing/2010/main" xmlns="" w="9525">
                     <a:solidFill>
                       <a:srgbClr val="000000"/>
                     </a:solidFill>
@@ -11477,7 +11493,7 @@
               </a:ln>
               <a:extLst>
                 <a:ext uri="{91240B29-F687-4f45-9708-019B960494DF}">
-                  <a14:hiddenLine xmlns="" xmlns:a14="http://schemas.microsoft.com/office/drawing/2010/main" w="9525">
+                  <a14:hiddenLine xmlns:a14="http://schemas.microsoft.com/office/drawing/2010/main" xmlns="" w="9525">
                     <a:solidFill>
                       <a:srgbClr val="000000"/>
                     </a:solidFill>
@@ -11539,7 +11555,7 @@
               </a:ln>
               <a:extLst>
                 <a:ext uri="{91240B29-F687-4f45-9708-019B960494DF}">
-                  <a14:hiddenLine xmlns="" xmlns:a14="http://schemas.microsoft.com/office/drawing/2010/main" w="9525">
+                  <a14:hiddenLine xmlns:a14="http://schemas.microsoft.com/office/drawing/2010/main" xmlns="" w="9525">
                     <a:solidFill>
                       <a:srgbClr val="000000"/>
                     </a:solidFill>
@@ -11629,7 +11645,7 @@
               </a:ln>
               <a:extLst>
                 <a:ext uri="{91240B29-F687-4f45-9708-019B960494DF}">
-                  <a14:hiddenLine xmlns="" xmlns:a14="http://schemas.microsoft.com/office/drawing/2010/main" w="9525">
+                  <a14:hiddenLine xmlns:a14="http://schemas.microsoft.com/office/drawing/2010/main" xmlns="" w="9525">
                     <a:solidFill>
                       <a:srgbClr val="000000"/>
                     </a:solidFill>
@@ -11719,7 +11735,7 @@
               </a:ln>
               <a:extLst>
                 <a:ext uri="{91240B29-F687-4f45-9708-019B960494DF}">
-                  <a14:hiddenLine xmlns="" xmlns:a14="http://schemas.microsoft.com/office/drawing/2010/main" w="9525">
+                  <a14:hiddenLine xmlns:a14="http://schemas.microsoft.com/office/drawing/2010/main" xmlns="" w="9525">
                     <a:solidFill>
                       <a:srgbClr val="000000"/>
                     </a:solidFill>
@@ -11784,7 +11800,7 @@
               </a:ln>
               <a:extLst>
                 <a:ext uri="{91240B29-F687-4f45-9708-019B960494DF}">
-                  <a14:hiddenLine xmlns="" xmlns:a14="http://schemas.microsoft.com/office/drawing/2010/main" w="9525">
+                  <a14:hiddenLine xmlns:a14="http://schemas.microsoft.com/office/drawing/2010/main" xmlns="" w="9525">
                     <a:solidFill>
                       <a:srgbClr val="000000"/>
                     </a:solidFill>
@@ -11904,7 +11920,7 @@
               </a:ln>
               <a:extLst>
                 <a:ext uri="{91240B29-F687-4f45-9708-019B960494DF}">
-                  <a14:hiddenLine xmlns="" xmlns:a14="http://schemas.microsoft.com/office/drawing/2010/main" w="9525">
+                  <a14:hiddenLine xmlns:a14="http://schemas.microsoft.com/office/drawing/2010/main" xmlns="" w="9525">
                     <a:solidFill>
                       <a:srgbClr val="000000"/>
                     </a:solidFill>
@@ -12002,7 +12018,7 @@
               </a:ln>
               <a:extLst>
                 <a:ext uri="{91240B29-F687-4f45-9708-019B960494DF}">
-                  <a14:hiddenLine xmlns="" xmlns:a14="http://schemas.microsoft.com/office/drawing/2010/main" w="9525">
+                  <a14:hiddenLine xmlns:a14="http://schemas.microsoft.com/office/drawing/2010/main" xmlns="" w="9525">
                     <a:solidFill>
                       <a:srgbClr val="000000"/>
                     </a:solidFill>
@@ -12117,7 +12133,7 @@
               </a:ln>
               <a:extLst>
                 <a:ext uri="{91240B29-F687-4f45-9708-019B960494DF}">
-                  <a14:hiddenLine xmlns="" xmlns:a14="http://schemas.microsoft.com/office/drawing/2010/main" w="9525">
+                  <a14:hiddenLine xmlns:a14="http://schemas.microsoft.com/office/drawing/2010/main" xmlns="" w="9525">
                     <a:solidFill>
                       <a:srgbClr val="000000"/>
                     </a:solidFill>
@@ -12207,7 +12223,7 @@
               </a:ln>
               <a:extLst>
                 <a:ext uri="{91240B29-F687-4f45-9708-019B960494DF}">
-                  <a14:hiddenLine xmlns="" xmlns:a14="http://schemas.microsoft.com/office/drawing/2010/main" w="9525">
+                  <a14:hiddenLine xmlns:a14="http://schemas.microsoft.com/office/drawing/2010/main" xmlns="" w="9525">
                     <a:solidFill>
                       <a:srgbClr val="000000"/>
                     </a:solidFill>
@@ -12272,7 +12288,7 @@
               </a:ln>
               <a:extLst>
                 <a:ext uri="{91240B29-F687-4f45-9708-019B960494DF}">
-                  <a14:hiddenLine xmlns="" xmlns:a14="http://schemas.microsoft.com/office/drawing/2010/main" w="9525">
+                  <a14:hiddenLine xmlns:a14="http://schemas.microsoft.com/office/drawing/2010/main" xmlns="" w="9525">
                     <a:solidFill>
                       <a:srgbClr val="000000"/>
                     </a:solidFill>
@@ -12362,7 +12378,7 @@
               </a:ln>
               <a:extLst>
                 <a:ext uri="{91240B29-F687-4f45-9708-019B960494DF}">
-                  <a14:hiddenLine xmlns="" xmlns:a14="http://schemas.microsoft.com/office/drawing/2010/main" w="9525">
+                  <a14:hiddenLine xmlns:a14="http://schemas.microsoft.com/office/drawing/2010/main" xmlns="" w="9525">
                     <a:solidFill>
                       <a:srgbClr val="000000"/>
                     </a:solidFill>
@@ -12430,7 +12446,7 @@
               </a:ln>
               <a:extLst>
                 <a:ext uri="{91240B29-F687-4f45-9708-019B960494DF}">
-                  <a14:hiddenLine xmlns="" xmlns:a14="http://schemas.microsoft.com/office/drawing/2010/main" w="9525">
+                  <a14:hiddenLine xmlns:a14="http://schemas.microsoft.com/office/drawing/2010/main" xmlns="" w="9525">
                     <a:solidFill>
                       <a:srgbClr val="000000"/>
                     </a:solidFill>
@@ -12520,7 +12536,7 @@
               </a:ln>
               <a:extLst>
                 <a:ext uri="{91240B29-F687-4f45-9708-019B960494DF}">
-                  <a14:hiddenLine xmlns="" xmlns:a14="http://schemas.microsoft.com/office/drawing/2010/main" w="9525">
+                  <a14:hiddenLine xmlns:a14="http://schemas.microsoft.com/office/drawing/2010/main" xmlns="" w="9525">
                     <a:solidFill>
                       <a:srgbClr val="000000"/>
                     </a:solidFill>
@@ -12588,7 +12604,7 @@
               </a:ln>
               <a:extLst>
                 <a:ext uri="{91240B29-F687-4f45-9708-019B960494DF}">
-                  <a14:hiddenLine xmlns="" xmlns:a14="http://schemas.microsoft.com/office/drawing/2010/main" w="9525">
+                  <a14:hiddenLine xmlns:a14="http://schemas.microsoft.com/office/drawing/2010/main" xmlns="" w="9525">
                     <a:solidFill>
                       <a:srgbClr val="000000"/>
                     </a:solidFill>
@@ -12678,7 +12694,7 @@
               </a:ln>
               <a:extLst>
                 <a:ext uri="{91240B29-F687-4f45-9708-019B960494DF}">
-                  <a14:hiddenLine xmlns="" xmlns:a14="http://schemas.microsoft.com/office/drawing/2010/main" w="9525">
+                  <a14:hiddenLine xmlns:a14="http://schemas.microsoft.com/office/drawing/2010/main" xmlns="" w="9525">
                     <a:solidFill>
                       <a:srgbClr val="000000"/>
                     </a:solidFill>
@@ -12712,7 +12728,7 @@
               </a:ln>
               <a:extLst>
                 <a:ext uri="{91240B29-F687-4f45-9708-019B960494DF}">
-                  <a14:hiddenLine xmlns="" xmlns:a14="http://schemas.microsoft.com/office/drawing/2010/main" w="9525">
+                  <a14:hiddenLine xmlns:a14="http://schemas.microsoft.com/office/drawing/2010/main" xmlns="" w="9525">
                     <a:solidFill>
                       <a:srgbClr val="000000"/>
                     </a:solidFill>
@@ -12852,7 +12868,7 @@
           <a:p>
             <a:fld id="{9F451DDC-D80E-410B-94F7-6BC23402F4C3}" type="datetimeFigureOut">
               <a:rPr lang="es-AR" smtClean="0"/>
-              <a:t>5/3/2024</a:t>
+              <a:t>7/3/2024</a:t>
             </a:fld>
             <a:endParaRPr lang="es-AR"/>
           </a:p>
@@ -14663,7 +14679,7 @@
         </p:blipFill>
         <p:spPr>
           <a:xfrm>
-            <a:off x="769685" y="1343564"/>
+            <a:off x="453196" y="1163260"/>
             <a:ext cx="5455830" cy="2957980"/>
           </a:xfrm>
           <a:ln>
@@ -14675,10 +14691,10 @@
       </p:pic>
       <p:pic>
         <p:nvPicPr>
-          <p:cNvPr id="14" name="Imagen 13">
+          <p:cNvPr id="4" name="Imagen 3">
             <a:extLst>
               <a:ext uri="{FF2B5EF4-FFF2-40B4-BE49-F238E27FC236}">
-                <a16:creationId xmlns:a16="http://schemas.microsoft.com/office/drawing/2014/main" id="{BFCF1E09-1455-E69C-8214-F995E30787E5}"/>
+                <a16:creationId xmlns:a16="http://schemas.microsoft.com/office/drawing/2014/main" id="{483B8B04-59FD-759C-2850-8D6AA6CDBBBF}"/>
               </a:ext>
             </a:extLst>
           </p:cNvPr>
@@ -14701,17 +14717,12 @@
         </p:blipFill>
         <p:spPr>
           <a:xfrm>
-            <a:off x="6272140" y="3263852"/>
-            <a:ext cx="5150175" cy="3245478"/>
+            <a:off x="6037781" y="3462371"/>
+            <a:ext cx="5701023" cy="3227263"/>
           </a:xfrm>
           <a:prstGeom prst="rect">
             <a:avLst/>
           </a:prstGeom>
-          <a:ln>
-            <a:solidFill>
-              <a:schemeClr val="bg1"/>
-            </a:solidFill>
-          </a:ln>
         </p:spPr>
       </p:pic>
     </p:spTree>
@@ -14749,47 +14760,6 @@
       </p:grpSpPr>
       <p:pic>
         <p:nvPicPr>
-          <p:cNvPr id="5" name="Imagen 4">
-            <a:extLst>
-              <a:ext uri="{FF2B5EF4-FFF2-40B4-BE49-F238E27FC236}">
-                <a16:creationId xmlns:a16="http://schemas.microsoft.com/office/drawing/2014/main" id="{2A6C19B0-B344-BD14-DB3D-D014BBEC15AD}"/>
-              </a:ext>
-            </a:extLst>
-          </p:cNvPr>
-          <p:cNvPicPr>
-            <a:picLocks noChangeAspect="1"/>
-          </p:cNvPicPr>
-          <p:nvPr/>
-        </p:nvPicPr>
-        <p:blipFill>
-          <a:blip r:embed="rId2">
-            <a:extLst>
-              <a:ext uri="{28A0092B-C50C-407E-A947-70E740481C1C}">
-                <a14:useLocalDpi xmlns:a14="http://schemas.microsoft.com/office/drawing/2010/main" val="0"/>
-              </a:ext>
-            </a:extLst>
-          </a:blip>
-          <a:stretch>
-            <a:fillRect/>
-          </a:stretch>
-        </p:blipFill>
-        <p:spPr>
-          <a:xfrm>
-            <a:off x="1454109" y="3220884"/>
-            <a:ext cx="7786656" cy="3492229"/>
-          </a:xfrm>
-          <a:prstGeom prst="rect">
-            <a:avLst/>
-          </a:prstGeom>
-          <a:ln>
-            <a:solidFill>
-              <a:schemeClr val="bg1"/>
-            </a:solidFill>
-          </a:ln>
-        </p:spPr>
-      </p:pic>
-      <p:pic>
-        <p:nvPicPr>
           <p:cNvPr id="11" name="Marcador de contenido 10">
             <a:extLst>
               <a:ext uri="{FF2B5EF4-FFF2-40B4-BE49-F238E27FC236}">
@@ -14803,7 +14773,7 @@
           <p:nvPr/>
         </p:nvPicPr>
         <p:blipFill>
-          <a:blip r:embed="rId3">
+          <a:blip r:embed="rId2">
             <a:extLst>
               <a:ext uri="{28A0092B-C50C-407E-A947-70E740481C1C}">
                 <a14:useLocalDpi xmlns:a14="http://schemas.microsoft.com/office/drawing/2010/main" val="0"/>
@@ -14827,6 +14797,42 @@
               <a:schemeClr val="bg1"/>
             </a:solidFill>
           </a:ln>
+        </p:spPr>
+      </p:pic>
+      <p:pic>
+        <p:nvPicPr>
+          <p:cNvPr id="3" name="Imagen 2">
+            <a:extLst>
+              <a:ext uri="{FF2B5EF4-FFF2-40B4-BE49-F238E27FC236}">
+                <a16:creationId xmlns:a16="http://schemas.microsoft.com/office/drawing/2014/main" id="{6C0075CB-9718-B18E-F2FE-123E399FFB17}"/>
+              </a:ext>
+            </a:extLst>
+          </p:cNvPr>
+          <p:cNvPicPr>
+            <a:picLocks noChangeAspect="1"/>
+          </p:cNvPicPr>
+          <p:nvPr/>
+        </p:nvPicPr>
+        <p:blipFill>
+          <a:blip r:embed="rId3">
+            <a:extLst>
+              <a:ext uri="{28A0092B-C50C-407E-A947-70E740481C1C}">
+                <a14:useLocalDpi xmlns:a14="http://schemas.microsoft.com/office/drawing/2010/main" val="0"/>
+              </a:ext>
+            </a:extLst>
+          </a:blip>
+          <a:stretch>
+            <a:fillRect/>
+          </a:stretch>
+        </p:blipFill>
+        <p:spPr>
+          <a:xfrm>
+            <a:off x="920051" y="3250487"/>
+            <a:ext cx="6086056" cy="3462626"/>
+          </a:xfrm>
+          <a:prstGeom prst="rect">
+            <a:avLst/>
+          </a:prstGeom>
         </p:spPr>
       </p:pic>
     </p:spTree>

</xml_diff>